<commit_message>
Update OrderFindCommandSequenceDiagram for DeveloperGuide
</commit_message>
<xml_diff>
--- a/docs/diagrams/OrderFindCommandSequenceDiagram.pptx
+++ b/docs/diagrams/OrderFindCommandSequenceDiagram.pptx
@@ -261,7 +261,7 @@
           <a:p>
             <a:fld id="{1A1E3181-4089-4178-A264-7BE145A909A0}" type="datetimeFigureOut">
               <a:rPr lang="en-SG" smtClean="0"/>
-              <a:t>15/10/2018</a:t>
+              <a:t>16/10/2018</a:t>
             </a:fld>
             <a:endParaRPr lang="en-SG"/>
           </a:p>
@@ -461,7 +461,7 @@
           <a:p>
             <a:fld id="{1A1E3181-4089-4178-A264-7BE145A909A0}" type="datetimeFigureOut">
               <a:rPr lang="en-SG" smtClean="0"/>
-              <a:t>15/10/2018</a:t>
+              <a:t>16/10/2018</a:t>
             </a:fld>
             <a:endParaRPr lang="en-SG"/>
           </a:p>
@@ -671,7 +671,7 @@
           <a:p>
             <a:fld id="{1A1E3181-4089-4178-A264-7BE145A909A0}" type="datetimeFigureOut">
               <a:rPr lang="en-SG" smtClean="0"/>
-              <a:t>15/10/2018</a:t>
+              <a:t>16/10/2018</a:t>
             </a:fld>
             <a:endParaRPr lang="en-SG"/>
           </a:p>
@@ -871,7 +871,7 @@
           <a:p>
             <a:fld id="{1A1E3181-4089-4178-A264-7BE145A909A0}" type="datetimeFigureOut">
               <a:rPr lang="en-SG" smtClean="0"/>
-              <a:t>15/10/2018</a:t>
+              <a:t>16/10/2018</a:t>
             </a:fld>
             <a:endParaRPr lang="en-SG"/>
           </a:p>
@@ -1147,7 +1147,7 @@
           <a:p>
             <a:fld id="{1A1E3181-4089-4178-A264-7BE145A909A0}" type="datetimeFigureOut">
               <a:rPr lang="en-SG" smtClean="0"/>
-              <a:t>15/10/2018</a:t>
+              <a:t>16/10/2018</a:t>
             </a:fld>
             <a:endParaRPr lang="en-SG"/>
           </a:p>
@@ -1415,7 +1415,7 @@
           <a:p>
             <a:fld id="{1A1E3181-4089-4178-A264-7BE145A909A0}" type="datetimeFigureOut">
               <a:rPr lang="en-SG" smtClean="0"/>
-              <a:t>15/10/2018</a:t>
+              <a:t>16/10/2018</a:t>
             </a:fld>
             <a:endParaRPr lang="en-SG"/>
           </a:p>
@@ -1830,7 +1830,7 @@
           <a:p>
             <a:fld id="{1A1E3181-4089-4178-A264-7BE145A909A0}" type="datetimeFigureOut">
               <a:rPr lang="en-SG" smtClean="0"/>
-              <a:t>15/10/2018</a:t>
+              <a:t>16/10/2018</a:t>
             </a:fld>
             <a:endParaRPr lang="en-SG"/>
           </a:p>
@@ -1972,7 +1972,7 @@
           <a:p>
             <a:fld id="{1A1E3181-4089-4178-A264-7BE145A909A0}" type="datetimeFigureOut">
               <a:rPr lang="en-SG" smtClean="0"/>
-              <a:t>15/10/2018</a:t>
+              <a:t>16/10/2018</a:t>
             </a:fld>
             <a:endParaRPr lang="en-SG"/>
           </a:p>
@@ -2085,7 +2085,7 @@
           <a:p>
             <a:fld id="{1A1E3181-4089-4178-A264-7BE145A909A0}" type="datetimeFigureOut">
               <a:rPr lang="en-SG" smtClean="0"/>
-              <a:t>15/10/2018</a:t>
+              <a:t>16/10/2018</a:t>
             </a:fld>
             <a:endParaRPr lang="en-SG"/>
           </a:p>
@@ -2398,7 +2398,7 @@
           <a:p>
             <a:fld id="{1A1E3181-4089-4178-A264-7BE145A909A0}" type="datetimeFigureOut">
               <a:rPr lang="en-SG" smtClean="0"/>
-              <a:t>15/10/2018</a:t>
+              <a:t>16/10/2018</a:t>
             </a:fld>
             <a:endParaRPr lang="en-SG"/>
           </a:p>
@@ -2687,7 +2687,7 @@
           <a:p>
             <a:fld id="{1A1E3181-4089-4178-A264-7BE145A909A0}" type="datetimeFigureOut">
               <a:rPr lang="en-SG" smtClean="0"/>
-              <a:t>15/10/2018</a:t>
+              <a:t>16/10/2018</a:t>
             </a:fld>
             <a:endParaRPr lang="en-SG"/>
           </a:p>
@@ -2930,7 +2930,7 @@
           <a:p>
             <a:fld id="{1A1E3181-4089-4178-A264-7BE145A909A0}" type="datetimeFigureOut">
               <a:rPr lang="en-SG" smtClean="0"/>
-              <a:t>15/10/2018</a:t>
+              <a:t>16/10/2018</a:t>
             </a:fld>
             <a:endParaRPr lang="en-SG"/>
           </a:p>
@@ -4036,9 +4036,9 @@
           <p:nvPr/>
         </p:nvCxnSpPr>
         <p:spPr>
-          <a:xfrm>
-            <a:off x="3730952" y="1973239"/>
-            <a:ext cx="618410" cy="1"/>
+          <a:xfrm flipV="1">
+            <a:off x="3699446" y="1973240"/>
+            <a:ext cx="649916" cy="5843"/>
           </a:xfrm>
           <a:prstGeom prst="straightConnector1">
             <a:avLst/>
@@ -5430,7 +5430,7 @@
         </p:nvSpPr>
         <p:spPr>
           <a:xfrm>
-            <a:off x="4259966" y="4486118"/>
+            <a:off x="3796719" y="4494324"/>
             <a:ext cx="1254808" cy="184666"/>
           </a:xfrm>
           <a:prstGeom prst="rect">
@@ -6111,7 +6111,7 @@
         </p:nvSpPr>
         <p:spPr>
           <a:xfrm>
-            <a:off x="6799289" y="6065271"/>
+            <a:off x="4696366" y="6074886"/>
             <a:ext cx="1254808" cy="184666"/>
           </a:xfrm>
           <a:prstGeom prst="rect">
@@ -6172,7 +6172,7 @@
                   <a:srgbClr val="0070C0"/>
                 </a:solidFill>
               </a:rPr>
-              <a:t>f</a:t>
+              <a:t>r</a:t>
             </a:r>
           </a:p>
         </p:txBody>

</xml_diff>